<commit_message>
nothing of major importance
</commit_message>
<xml_diff>
--- a/CarMax Analytics Showcase.pptx
+++ b/CarMax Analytics Showcase.pptx
@@ -31092,7 +31092,7 @@
           <a:p>
             <a:fld id="{48BEF267-64F0-4CC9-873D-D18C688603BC}" type="datetimeFigureOut">
               <a:rPr lang="en-US" smtClean="0"/>
-              <a:t>2/10/2020</a:t>
+              <a:t>2/11/2020</a:t>
             </a:fld>
             <a:endParaRPr lang="en-US"/>
           </a:p>
@@ -31262,7 +31262,7 @@
           <a:p>
             <a:fld id="{48BEF267-64F0-4CC9-873D-D18C688603BC}" type="datetimeFigureOut">
               <a:rPr lang="en-US" smtClean="0"/>
-              <a:t>2/10/2020</a:t>
+              <a:t>2/11/2020</a:t>
             </a:fld>
             <a:endParaRPr lang="en-US"/>
           </a:p>
@@ -31442,7 +31442,7 @@
           <a:p>
             <a:fld id="{48BEF267-64F0-4CC9-873D-D18C688603BC}" type="datetimeFigureOut">
               <a:rPr lang="en-US" smtClean="0"/>
-              <a:t>2/10/2020</a:t>
+              <a:t>2/11/2020</a:t>
             </a:fld>
             <a:endParaRPr lang="en-US"/>
           </a:p>
@@ -31612,7 +31612,7 @@
           <a:p>
             <a:fld id="{48BEF267-64F0-4CC9-873D-D18C688603BC}" type="datetimeFigureOut">
               <a:rPr lang="en-US" smtClean="0"/>
-              <a:t>2/10/2020</a:t>
+              <a:t>2/11/2020</a:t>
             </a:fld>
             <a:endParaRPr lang="en-US"/>
           </a:p>
@@ -31858,7 +31858,7 @@
           <a:p>
             <a:fld id="{48BEF267-64F0-4CC9-873D-D18C688603BC}" type="datetimeFigureOut">
               <a:rPr lang="en-US" smtClean="0"/>
-              <a:t>2/10/2020</a:t>
+              <a:t>2/11/2020</a:t>
             </a:fld>
             <a:endParaRPr lang="en-US"/>
           </a:p>
@@ -32090,7 +32090,7 @@
           <a:p>
             <a:fld id="{48BEF267-64F0-4CC9-873D-D18C688603BC}" type="datetimeFigureOut">
               <a:rPr lang="en-US" smtClean="0"/>
-              <a:t>2/10/2020</a:t>
+              <a:t>2/11/2020</a:t>
             </a:fld>
             <a:endParaRPr lang="en-US"/>
           </a:p>
@@ -32457,7 +32457,7 @@
           <a:p>
             <a:fld id="{48BEF267-64F0-4CC9-873D-D18C688603BC}" type="datetimeFigureOut">
               <a:rPr lang="en-US" smtClean="0"/>
-              <a:t>2/10/2020</a:t>
+              <a:t>2/11/2020</a:t>
             </a:fld>
             <a:endParaRPr lang="en-US"/>
           </a:p>
@@ -32575,7 +32575,7 @@
           <a:p>
             <a:fld id="{48BEF267-64F0-4CC9-873D-D18C688603BC}" type="datetimeFigureOut">
               <a:rPr lang="en-US" smtClean="0"/>
-              <a:t>2/10/2020</a:t>
+              <a:t>2/11/2020</a:t>
             </a:fld>
             <a:endParaRPr lang="en-US"/>
           </a:p>
@@ -32670,7 +32670,7 @@
           <a:p>
             <a:fld id="{48BEF267-64F0-4CC9-873D-D18C688603BC}" type="datetimeFigureOut">
               <a:rPr lang="en-US" smtClean="0"/>
-              <a:t>2/10/2020</a:t>
+              <a:t>2/11/2020</a:t>
             </a:fld>
             <a:endParaRPr lang="en-US"/>
           </a:p>
@@ -32947,7 +32947,7 @@
           <a:p>
             <a:fld id="{48BEF267-64F0-4CC9-873D-D18C688603BC}" type="datetimeFigureOut">
               <a:rPr lang="en-US" smtClean="0"/>
-              <a:t>2/10/2020</a:t>
+              <a:t>2/11/2020</a:t>
             </a:fld>
             <a:endParaRPr lang="en-US"/>
           </a:p>
@@ -33204,7 +33204,7 @@
           <a:p>
             <a:fld id="{48BEF267-64F0-4CC9-873D-D18C688603BC}" type="datetimeFigureOut">
               <a:rPr lang="en-US" smtClean="0"/>
-              <a:t>2/10/2020</a:t>
+              <a:t>2/11/2020</a:t>
             </a:fld>
             <a:endParaRPr lang="en-US"/>
           </a:p>
@@ -33417,7 +33417,7 @@
           <a:p>
             <a:fld id="{48BEF267-64F0-4CC9-873D-D18C688603BC}" type="datetimeFigureOut">
               <a:rPr lang="en-US" smtClean="0"/>
-              <a:t>2/10/2020</a:t>
+              <a:t>2/11/2020</a:t>
             </a:fld>
             <a:endParaRPr lang="en-US"/>
           </a:p>
@@ -34128,10 +34128,7 @@
           <a:lstStyle/>
           <a:p>
             <a:r>
-              <a:rPr lang="en-US" sz="4000" kern="1200">
-                <a:solidFill>
-                  <a:srgbClr val="303030"/>
-                </a:solidFill>
+              <a:rPr lang="en-US" sz="4000" kern="1200" dirty="0">
                 <a:latin typeface="+mj-lt"/>
                 <a:ea typeface="+mj-ea"/>
                 <a:cs typeface="+mj-cs"/>
@@ -38329,6 +38326,14 @@
 <file path=ppt/slides/slide17.xml><?xml version="1.0" encoding="utf-8"?>
 <p:sld xmlns:a="http://schemas.openxmlformats.org/drawingml/2006/main" xmlns:r="http://schemas.openxmlformats.org/officeDocument/2006/relationships" xmlns:p="http://schemas.openxmlformats.org/presentationml/2006/main">
   <p:cSld>
+    <p:bg>
+      <p:bgPr>
+        <a:solidFill>
+          <a:schemeClr val="accent1"/>
+        </a:solidFill>
+        <a:effectLst/>
+      </p:bgPr>
+    </p:bg>
     <p:spTree>
       <p:nvGrpSpPr>
         <p:cNvPr id="1" name=""/>

</xml_diff>